<commit_message>
Updates for ECP AM tutorial
</commit_message>
<xml_diff>
--- a/final-presentations/2021-04-12-ecpam/00-intro.pptx
+++ b/final-presentations/2021-04-12-ecpam/00-intro.pptx
@@ -12,7 +12,7 @@
   </p:handoutMasterIdLst>
   <p:sldIdLst>
     <p:sldId id="256" r:id="rId5"/>
-    <p:sldId id="320" r:id="rId6"/>
+    <p:sldId id="1847" r:id="rId6"/>
     <p:sldId id="308" r:id="rId7"/>
     <p:sldId id="327" r:id="rId8"/>
     <p:sldId id="324" r:id="rId9"/>
@@ -275,7 +275,7 @@
           <a:p>
             <a:fld id="{0B842F42-2CE9-4E35-95C1-410DC08A50B1}" type="datetimeFigureOut">
               <a:rPr lang="en-US" smtClean="0"/>
-              <a:t>4/9/2021</a:t>
+              <a:t>4/10/2021</a:t>
             </a:fld>
             <a:endParaRPr lang="en-US"/>
           </a:p>
@@ -440,7 +440,7 @@
           <a:p>
             <a:fld id="{6F282904-F315-4730-8D91-37D99E141A6F}" type="datetimeFigureOut">
               <a:rPr lang="en-US" smtClean="0"/>
-              <a:t>4/9/2021</a:t>
+              <a:t>4/10/2021</a:t>
             </a:fld>
             <a:endParaRPr lang="en-US"/>
           </a:p>
@@ -4083,13 +4083,29 @@
             </a:pPr>
             <a:r>
               <a:rPr lang="en-US" sz="1600" b="1" dirty="0"/>
-              <a:t>The requested citation the overall tutorial is: David E. Bernholdt, Anshu Dubey, Rinku K. Gupta, and David M. Rogers, Better Scientific Software tutorial, in Improving Scientific Software conference, online, 2021. DOI: </a:t>
+              <a:t>The requested citation the overall tutorial is: David E. Bernholdt, Patricia A. Grubel, and James M. </a:t>
+            </a:r>
+            <a:r>
+              <a:rPr lang="en-US" sz="1600" b="1" dirty="0" err="1"/>
+              <a:t>Willenbring</a:t>
+            </a:r>
+            <a:r>
+              <a:rPr lang="en-US" sz="1600" b="1" dirty="0"/>
+              <a:t>, Developing a Testing and Continuous Integration Strategy for your Team tutorial, in </a:t>
+            </a:r>
+            <a:r>
+              <a:rPr lang="en-US" sz="1600" b="1" dirty="0" err="1"/>
+              <a:t>Exascale</a:t>
+            </a:r>
+            <a:r>
+              <a:rPr lang="en-US" sz="1600" b="1" dirty="0"/>
+              <a:t> Computing Project Annual Meeting, online, 2021. DOI: </a:t>
             </a:r>
             <a:r>
               <a:rPr lang="en-US" sz="1600" b="1" dirty="0">
                 <a:hlinkClick r:id="rId4"/>
               </a:rPr>
-              <a:t>10.6084/m9.figshare.14256257</a:t>
+              <a:t>10.6084/m9.figshare.14376956</a:t>
             </a:r>
             <a:endParaRPr lang="en-US" sz="1600" b="1" dirty="0"/>
           </a:p>
@@ -4132,15 +4148,7 @@
             </a:pPr>
             <a:r>
               <a:rPr lang="en-US" sz="1400" dirty="0"/>
-              <a:t>Additional contributors include: Mike </a:t>
-            </a:r>
-            <a:r>
-              <a:rPr lang="en-US" sz="1400" dirty="0" err="1"/>
-              <a:t>Heroux</a:t>
-            </a:r>
-            <a:r>
-              <a:rPr lang="en-US" sz="1400" dirty="0"/>
-              <a:t>, Alicia </a:t>
+              <a:t>Additional contributors include: David E. Bernholdt, Anshu Dubey, Rinku K. Gupta, Mike Heroux, Alicia </a:t>
             </a:r>
             <a:r>
               <a:rPr lang="en-US" sz="1400" dirty="0" err="1"/>
@@ -4295,7 +4303,7 @@
     </p:spTree>
     <p:extLst>
       <p:ext uri="{BB962C8B-B14F-4D97-AF65-F5344CB8AC3E}">
-        <p14:creationId xmlns:p14="http://schemas.microsoft.com/office/powerpoint/2010/main" val="978726433"/>
+        <p14:creationId xmlns:p14="http://schemas.microsoft.com/office/powerpoint/2010/main" val="1101222383"/>
       </p:ext>
     </p:extLst>
   </p:cSld>
@@ -8448,8 +8456,8 @@
         </p:nvSpPr>
         <p:spPr>
           <a:xfrm>
-            <a:off x="584894" y="6127075"/>
-            <a:ext cx="4320818" cy="683264"/>
+            <a:off x="4278943" y="6091636"/>
+            <a:ext cx="2811145" cy="572464"/>
           </a:xfrm>
           <a:prstGeom prst="rect">
             <a:avLst/>
@@ -8468,15 +8476,15 @@
               </a:lnSpc>
             </a:pPr>
             <a:r>
-              <a:rPr lang="en-US" dirty="0">
+              <a:rPr lang="en-US" sz="1400" dirty="0">
                 <a:solidFill>
                   <a:schemeClr val="tx2"/>
                 </a:solidFill>
               </a:rPr>
-              <a:t>For more about our work see this report: </a:t>
-            </a:r>
-            <a:r>
-              <a:rPr lang="en-US" dirty="0">
+              <a:t>Or read our 2020 project report: </a:t>
+            </a:r>
+            <a:r>
+              <a:rPr lang="en-US" sz="1400" dirty="0">
                 <a:solidFill>
                   <a:schemeClr val="tx2"/>
                 </a:solidFill>
@@ -8490,11 +8498,90 @@
               </a:rPr>
               <a:t>https://doi.org/10.2172/1606662</a:t>
             </a:r>
-            <a:endParaRPr lang="en-US" dirty="0">
+            <a:endParaRPr lang="en-US" sz="1400" dirty="0">
               <a:solidFill>
                 <a:schemeClr val="tx2"/>
               </a:solidFill>
             </a:endParaRPr>
+          </a:p>
+        </p:txBody>
+      </p:sp>
+      <p:sp>
+        <p:nvSpPr>
+          <p:cNvPr id="42" name="TextBox 41">
+            <a:extLst>
+              <a:ext uri="{FF2B5EF4-FFF2-40B4-BE49-F238E27FC236}">
+                <a16:creationId xmlns:a16="http://schemas.microsoft.com/office/drawing/2014/main" id="{C856B7AA-B864-4953-B47F-75000AD3057B}"/>
+              </a:ext>
+            </a:extLst>
+          </p:cNvPr>
+          <p:cNvSpPr txBox="1"/>
+          <p:nvPr/>
+        </p:nvSpPr>
+        <p:spPr>
+          <a:xfrm>
+            <a:off x="584894" y="5897737"/>
+            <a:ext cx="3380737" cy="960263"/>
+          </a:xfrm>
+          <a:prstGeom prst="rect">
+            <a:avLst/>
+          </a:prstGeom>
+          <a:noFill/>
+        </p:spPr>
+        <p:txBody>
+          <a:bodyPr wrap="square" lIns="118872" tIns="91440" rIns="118872" bIns="91440" rtlCol="0" anchor="ctr" anchorCtr="0">
+            <a:spAutoFit/>
+          </a:bodyPr>
+          <a:lstStyle/>
+          <a:p>
+            <a:pPr>
+              <a:lnSpc>
+                <a:spcPct val="90000"/>
+              </a:lnSpc>
+            </a:pPr>
+            <a:r>
+              <a:rPr lang="en-US" sz="1400" dirty="0">
+                <a:solidFill>
+                  <a:schemeClr val="tx2"/>
+                </a:solidFill>
+                <a:latin typeface="+mn-lt"/>
+              </a:rPr>
+              <a:t>Join us for our information session </a:t>
+            </a:r>
+            <a:r>
+              <a:rPr lang="en-US" sz="1400" b="0" i="0" dirty="0">
+                <a:solidFill>
+                  <a:srgbClr val="333333"/>
+                </a:solidFill>
+                <a:effectLst/>
+                <a:latin typeface="+mn-lt"/>
+                <a:hlinkClick r:id="rId4"/>
+              </a:rPr>
+              <a:t>Advancing Scientific Productivity through Better Scientific Software</a:t>
+            </a:r>
+            <a:endParaRPr lang="en-US" sz="1400" b="0" i="0" dirty="0">
+              <a:solidFill>
+                <a:srgbClr val="333333"/>
+              </a:solidFill>
+              <a:effectLst/>
+              <a:latin typeface="+mn-lt"/>
+            </a:endParaRPr>
+          </a:p>
+          <a:p>
+            <a:pPr algn="l">
+              <a:lnSpc>
+                <a:spcPct val="90000"/>
+              </a:lnSpc>
+            </a:pPr>
+            <a:r>
+              <a:rPr lang="en-US" sz="1400" dirty="0">
+                <a:solidFill>
+                  <a:schemeClr val="tx2"/>
+                </a:solidFill>
+                <a:latin typeface="+mn-lt"/>
+              </a:rPr>
+              <a:t>11:30am-12:30pm ET Wednesday</a:t>
+            </a:r>
           </a:p>
         </p:txBody>
       </p:sp>
@@ -10532,7 +10619,7 @@
         </p:nvSpPr>
         <p:spPr>
           <a:xfrm>
-            <a:off x="365760" y="1226562"/>
+            <a:off x="365760" y="1163503"/>
             <a:ext cx="11369809" cy="4047778"/>
           </a:xfrm>
         </p:spPr>
@@ -10541,39 +10628,51 @@
           <a:lstStyle/>
           <a:p>
             <a:r>
-              <a:rPr lang="en-US" b="0" i="0" dirty="0">
+              <a:rPr lang="en-US" sz="2000" b="0" i="0" dirty="0">
                 <a:solidFill>
                   <a:srgbClr val="333333"/>
                 </a:solidFill>
                 <a:effectLst/>
                 <a:latin typeface="Helvetica Neue"/>
-                <a:hlinkClick r:id="rId2"/>
               </a:rPr>
-              <a:t>Validation, Verification and Performance Suites, Proxy Apps, and Continuous Integration for </a:t>
-            </a:r>
-            <a:r>
-              <a:rPr lang="en-US" b="0" i="0" dirty="0" err="1">
+              <a:t>IDEAS Desk – informal conversations about developer productivity and software sustainability</a:t>
+            </a:r>
+          </a:p>
+          <a:p>
+            <a:pPr lvl="1">
+              <a:spcBef>
+                <a:spcPts val="200"/>
+              </a:spcBef>
+            </a:pPr>
+            <a:r>
+              <a:rPr lang="en-US" sz="1800" dirty="0">
                 <a:solidFill>
                   <a:srgbClr val="333333"/>
                 </a:solidFill>
-                <a:effectLst/>
+                <a:latin typeface="Helvetica Neue"/>
+              </a:rPr>
+              <a:t>Room ??? In the </a:t>
+            </a:r>
+            <a:r>
+              <a:rPr lang="en-US" sz="1800" dirty="0" err="1">
+                <a:solidFill>
+                  <a:srgbClr val="333333"/>
+                </a:solidFill>
                 <a:latin typeface="Helvetica Neue"/>
                 <a:hlinkClick r:id="rId2"/>
               </a:rPr>
-              <a:t>Exascale</a:t>
-            </a:r>
-            <a:r>
-              <a:rPr lang="en-US" b="0" i="0" dirty="0">
+              <a:t>Gather.Town</a:t>
+            </a:r>
+            <a:r>
+              <a:rPr lang="en-US" sz="1800" dirty="0">
                 <a:solidFill>
                   <a:srgbClr val="333333"/>
                 </a:solidFill>
-                <a:effectLst/>
                 <a:latin typeface="Helvetica Neue"/>
-                <a:hlinkClick r:id="rId2"/>
               </a:rPr>
-              <a:t> Supercomputers</a:t>
-            </a:r>
-            <a:endParaRPr lang="en-US" b="0" i="0" dirty="0">
+              <a:t> Side Meetings area</a:t>
+            </a:r>
+            <a:endParaRPr lang="en-US" sz="1800" b="0" i="0" dirty="0">
               <a:solidFill>
                 <a:srgbClr val="333333"/>
               </a:solidFill>
@@ -10582,20 +10681,32 @@
             </a:endParaRPr>
           </a:p>
           <a:p>
-            <a:pPr lvl="1"/>
-            <a:r>
-              <a:rPr lang="en-US" dirty="0">
+            <a:pPr lvl="1">
+              <a:spcBef>
+                <a:spcPts val="200"/>
+              </a:spcBef>
+            </a:pPr>
+            <a:r>
+              <a:rPr lang="en-US" sz="1800" dirty="0">
                 <a:solidFill>
                   <a:srgbClr val="333333"/>
                 </a:solidFill>
                 <a:latin typeface="Helvetica Neue"/>
               </a:rPr>
-              <a:t>10:00am-11:30am Wednesday </a:t>
-            </a:r>
-          </a:p>
-          <a:p>
-            <a:r>
-              <a:rPr lang="en-US" b="0" i="0" dirty="0">
+              <a:t>12:30pm-4:00pm Tuesday through Friday</a:t>
+            </a:r>
+            <a:endParaRPr lang="en-US" sz="1800" b="0" i="0" dirty="0">
+              <a:solidFill>
+                <a:srgbClr val="333333"/>
+              </a:solidFill>
+              <a:effectLst/>
+              <a:latin typeface="Helvetica Neue"/>
+              <a:hlinkClick r:id="rId3"/>
+            </a:endParaRPr>
+          </a:p>
+          <a:p>
+            <a:r>
+              <a:rPr lang="en-US" sz="2000" b="0" i="0" dirty="0">
                 <a:solidFill>
                   <a:srgbClr val="333333"/>
                 </a:solidFill>
@@ -10603,9 +10714,31 @@
                 <a:latin typeface="Helvetica Neue"/>
                 <a:hlinkClick r:id="rId3"/>
               </a:rPr>
-              <a:t>Advancing Scientific Productivity through Better Scientific Software</a:t>
-            </a:r>
-            <a:endParaRPr lang="en-US" b="0" i="0" dirty="0">
+              <a:t>Validation, Verification and Performance Suites, Proxy Apps, and Continuous Integration for </a:t>
+            </a:r>
+            <a:r>
+              <a:rPr lang="en-US" sz="2000" b="0" i="0" dirty="0" err="1">
+                <a:solidFill>
+                  <a:srgbClr val="333333"/>
+                </a:solidFill>
+                <a:effectLst/>
+                <a:latin typeface="Helvetica Neue"/>
+                <a:hlinkClick r:id="rId3"/>
+              </a:rPr>
+              <a:t>Exascale</a:t>
+            </a:r>
+            <a:r>
+              <a:rPr lang="en-US" sz="2000" b="0" i="0" dirty="0">
+                <a:solidFill>
+                  <a:srgbClr val="333333"/>
+                </a:solidFill>
+                <a:effectLst/>
+                <a:latin typeface="Helvetica Neue"/>
+                <a:hlinkClick r:id="rId3"/>
+              </a:rPr>
+              <a:t> Supercomputers</a:t>
+            </a:r>
+            <a:endParaRPr lang="en-US" sz="2000" b="0" i="0" dirty="0">
               <a:solidFill>
                 <a:srgbClr val="333333"/>
               </a:solidFill>
@@ -10614,20 +10747,24 @@
             </a:endParaRPr>
           </a:p>
           <a:p>
-            <a:pPr lvl="1"/>
-            <a:r>
-              <a:rPr lang="en-US" dirty="0">
+            <a:pPr lvl="1">
+              <a:spcBef>
+                <a:spcPts val="200"/>
+              </a:spcBef>
+            </a:pPr>
+            <a:r>
+              <a:rPr lang="en-US" sz="1800" dirty="0">
                 <a:solidFill>
                   <a:srgbClr val="333333"/>
                 </a:solidFill>
                 <a:latin typeface="Helvetica Neue"/>
               </a:rPr>
-              <a:t>11:30am-12:30am Wednesday</a:t>
-            </a:r>
-          </a:p>
-          <a:p>
-            <a:r>
-              <a:rPr lang="en-US" b="0" i="0" dirty="0">
+              <a:t>10:00am-11:30am Wednesday </a:t>
+            </a:r>
+          </a:p>
+          <a:p>
+            <a:r>
+              <a:rPr lang="en-US" sz="2000" b="0" i="0" dirty="0">
                 <a:solidFill>
                   <a:srgbClr val="333333"/>
                 </a:solidFill>
@@ -10635,9 +10772,9 @@
                 <a:latin typeface="Helvetica Neue"/>
                 <a:hlinkClick r:id="rId4"/>
               </a:rPr>
-              <a:t>Hands-on with Progress Tracking Cards: A Lightweight Method for Improving Your Software Practices</a:t>
-            </a:r>
-            <a:endParaRPr lang="en-US" b="0" i="0" dirty="0">
+              <a:t>Advancing Scientific Productivity through Better Scientific Software</a:t>
+            </a:r>
+            <a:endParaRPr lang="en-US" sz="2000" b="0" i="0" dirty="0">
               <a:solidFill>
                 <a:srgbClr val="333333"/>
               </a:solidFill>
@@ -10646,20 +10783,24 @@
             </a:endParaRPr>
           </a:p>
           <a:p>
-            <a:pPr lvl="1"/>
-            <a:r>
-              <a:rPr lang="en-US" dirty="0">
+            <a:pPr lvl="1">
+              <a:spcBef>
+                <a:spcPts val="200"/>
+              </a:spcBef>
+            </a:pPr>
+            <a:r>
+              <a:rPr lang="en-US" sz="1800" dirty="0">
                 <a:solidFill>
                   <a:srgbClr val="333333"/>
                 </a:solidFill>
                 <a:latin typeface="Helvetica Neue"/>
               </a:rPr>
-              <a:t>1:00pm-3:30pm Wednesday</a:t>
-            </a:r>
-          </a:p>
-          <a:p>
-            <a:r>
-              <a:rPr lang="en-US" b="0" i="0" dirty="0">
+              <a:t>11:30am-12:30am Wednesday</a:t>
+            </a:r>
+          </a:p>
+          <a:p>
+            <a:r>
+              <a:rPr lang="en-US" sz="2000" b="0" i="0" dirty="0">
                 <a:solidFill>
                   <a:srgbClr val="333333"/>
                 </a:solidFill>
@@ -10667,9 +10808,9 @@
                 <a:latin typeface="Helvetica Neue"/>
                 <a:hlinkClick r:id="rId5"/>
               </a:rPr>
-              <a:t>Benefiting from ECP CI</a:t>
-            </a:r>
-            <a:endParaRPr lang="en-US" b="0" i="0" dirty="0">
+              <a:t>Hands-on with Progress Tracking Cards: A Lightweight Method for Improving Your Software Practices</a:t>
+            </a:r>
+            <a:endParaRPr lang="en-US" sz="2000" b="0" i="0" dirty="0">
               <a:solidFill>
                 <a:srgbClr val="333333"/>
               </a:solidFill>
@@ -10678,20 +10819,24 @@
             </a:endParaRPr>
           </a:p>
           <a:p>
-            <a:pPr lvl="1"/>
-            <a:r>
-              <a:rPr lang="en-US" dirty="0">
+            <a:pPr lvl="1">
+              <a:spcBef>
+                <a:spcPts val="200"/>
+              </a:spcBef>
+            </a:pPr>
+            <a:r>
+              <a:rPr lang="en-US" sz="1800" dirty="0">
                 <a:solidFill>
                   <a:srgbClr val="333333"/>
                 </a:solidFill>
                 <a:latin typeface="Helvetica Neue"/>
               </a:rPr>
-              <a:t>2:30pm-3:30pm Wednesday</a:t>
-            </a:r>
-          </a:p>
-          <a:p>
-            <a:r>
-              <a:rPr lang="en-US" b="0" i="0" dirty="0">
+              <a:t>1:00pm-3:30pm Wednesday</a:t>
+            </a:r>
+          </a:p>
+          <a:p>
+            <a:r>
+              <a:rPr lang="en-US" sz="2000" b="0" i="0" dirty="0">
                 <a:solidFill>
                   <a:srgbClr val="333333"/>
                 </a:solidFill>
@@ -10699,9 +10844,9 @@
                 <a:latin typeface="Helvetica Neue"/>
                 <a:hlinkClick r:id="rId6"/>
               </a:rPr>
-              <a:t>ECP CI Startup Tutorial</a:t>
-            </a:r>
-            <a:endParaRPr lang="en-US" b="0" i="0" dirty="0">
+              <a:t>Benefiting from ECP CI</a:t>
+            </a:r>
+            <a:endParaRPr lang="en-US" sz="2000" b="0" i="0" dirty="0">
               <a:solidFill>
                 <a:srgbClr val="333333"/>
               </a:solidFill>
@@ -10710,9 +10855,49 @@
             </a:endParaRPr>
           </a:p>
           <a:p>
-            <a:pPr lvl="1"/>
-            <a:r>
-              <a:rPr lang="en-US" dirty="0">
+            <a:pPr lvl="1">
+              <a:spcBef>
+                <a:spcPts val="200"/>
+              </a:spcBef>
+            </a:pPr>
+            <a:r>
+              <a:rPr lang="en-US" sz="1800" dirty="0">
+                <a:solidFill>
+                  <a:srgbClr val="333333"/>
+                </a:solidFill>
+                <a:latin typeface="Helvetica Neue"/>
+              </a:rPr>
+              <a:t>2:30pm-3:30pm Wednesday</a:t>
+            </a:r>
+          </a:p>
+          <a:p>
+            <a:r>
+              <a:rPr lang="en-US" sz="2000" b="0" i="0" dirty="0">
+                <a:solidFill>
+                  <a:srgbClr val="333333"/>
+                </a:solidFill>
+                <a:effectLst/>
+                <a:latin typeface="Helvetica Neue"/>
+                <a:hlinkClick r:id="rId7"/>
+              </a:rPr>
+              <a:t>ECP CI Startup Tutorial</a:t>
+            </a:r>
+            <a:endParaRPr lang="en-US" sz="2000" b="0" i="0" dirty="0">
+              <a:solidFill>
+                <a:srgbClr val="333333"/>
+              </a:solidFill>
+              <a:effectLst/>
+              <a:latin typeface="Helvetica Neue"/>
+            </a:endParaRPr>
+          </a:p>
+          <a:p>
+            <a:pPr lvl="1">
+              <a:spcBef>
+                <a:spcPts val="200"/>
+              </a:spcBef>
+            </a:pPr>
+            <a:r>
+              <a:rPr lang="en-US" sz="1800" dirty="0">
                 <a:solidFill>
                   <a:srgbClr val="333333"/>
                 </a:solidFill>
@@ -10720,7 +10905,7 @@
               </a:rPr>
               <a:t>2:30pm-6:00pm Friday</a:t>
             </a:r>
-            <a:endParaRPr lang="en-US" dirty="0"/>
+            <a:endParaRPr lang="en-US" sz="1800" dirty="0"/>
           </a:p>
         </p:txBody>
       </p:sp>
@@ -11650,21 +11835,6 @@
 </file>
 
 <file path=customXml/item1.xml><?xml version="1.0" encoding="utf-8"?>
-<?mso-contentType ?>
-<FormTemplates xmlns="http://schemas.microsoft.com/sharepoint/v3/contenttype/forms">
-  <Display>DocumentLibraryForm</Display>
-  <Edit>DocumentLibraryForm</Edit>
-  <New>DocumentLibraryForm</New>
-</FormTemplates>
-</file>
-
-<file path=customXml/item2.xml><?xml version="1.0" encoding="utf-8"?>
-<p:properties xmlns:p="http://schemas.microsoft.com/office/2006/metadata/properties" xmlns:xsi="http://www.w3.org/2001/XMLSchema-instance" xmlns:pc="http://schemas.microsoft.com/office/infopath/2007/PartnerControls">
-  <documentManagement/>
-</p:properties>
-</file>
-
-<file path=customXml/item3.xml><?xml version="1.0" encoding="utf-8"?>
 <ct:contentTypeSchema xmlns:ct="http://schemas.microsoft.com/office/2006/metadata/contentType" xmlns:ma="http://schemas.microsoft.com/office/2006/metadata/properties/metaAttributes" ct:_="" ma:_="" ma:contentTypeName="Document" ma:contentTypeID="0x010100565464437F680748A68B85EB6594EA7D" ma:contentTypeVersion="0" ma:contentTypeDescription="Create a new document." ma:contentTypeScope="" ma:versionID="fe3f4dd58d5914c51cfc6deaa8ad845c">
   <xsd:schema xmlns:xsd="http://www.w3.org/2001/XMLSchema" xmlns:p="http://schemas.microsoft.com/office/2006/metadata/properties" targetNamespace="http://schemas.microsoft.com/office/2006/metadata/properties" ma:root="true" ma:fieldsID="4aeb20c0e3442673af7ee10786458764">
     <xsd:element name="properties">
@@ -11713,7 +11883,37 @@
 </ct:contentTypeSchema>
 </file>
 
+<file path=customXml/item2.xml><?xml version="1.0" encoding="utf-8"?>
+<?mso-contentType ?>
+<FormTemplates xmlns="http://schemas.microsoft.com/sharepoint/v3/contenttype/forms">
+  <Display>DocumentLibraryForm</Display>
+  <Edit>DocumentLibraryForm</Edit>
+  <New>DocumentLibraryForm</New>
+</FormTemplates>
+</file>
+
+<file path=customXml/item3.xml><?xml version="1.0" encoding="utf-8"?>
+<p:properties xmlns:p="http://schemas.microsoft.com/office/2006/metadata/properties" xmlns:xsi="http://www.w3.org/2001/XMLSchema-instance" xmlns:pc="http://schemas.microsoft.com/office/infopath/2007/PartnerControls">
+  <documentManagement/>
+</p:properties>
+</file>
+
 <file path=customXml/itemProps1.xml><?xml version="1.0" encoding="utf-8"?>
+<ds:datastoreItem xmlns:ds="http://schemas.openxmlformats.org/officeDocument/2006/customXml" ds:itemID="{E8DB7DEB-074E-4EE8-9B6E-FD277323109C}">
+  <ds:schemaRefs>
+    <ds:schemaRef ds:uri="http://schemas.microsoft.com/office/2006/metadata/contentType"/>
+    <ds:schemaRef ds:uri="http://schemas.microsoft.com/office/2006/metadata/properties/metaAttributes"/>
+    <ds:schemaRef ds:uri="http://www.w3.org/2001/XMLSchema"/>
+    <ds:schemaRef ds:uri="http://schemas.microsoft.com/office/2006/metadata/properties"/>
+    <ds:schemaRef ds:uri="http://schemas.openxmlformats.org/package/2006/metadata/core-properties"/>
+    <ds:schemaRef ds:uri="http://purl.org/dc/elements/1.1/"/>
+    <ds:schemaRef ds:uri="http://purl.org/dc/terms/"/>
+    <ds:schemaRef ds:uri="http://schemas.microsoft.com/office/internal/2005/internalDocumentation"/>
+  </ds:schemaRefs>
+</ds:datastoreItem>
+</file>
+
+<file path=customXml/itemProps2.xml><?xml version="1.0" encoding="utf-8"?>
 <ds:datastoreItem xmlns:ds="http://schemas.openxmlformats.org/officeDocument/2006/customXml" ds:itemID="{19E20559-B232-4371-8690-E3D8007EDB82}">
   <ds:schemaRefs>
     <ds:schemaRef ds:uri="http://schemas.microsoft.com/sharepoint/v3/contenttype/forms"/>
@@ -11721,7 +11921,7 @@
 </ds:datastoreItem>
 </file>
 
-<file path=customXml/itemProps2.xml><?xml version="1.0" encoding="utf-8"?>
+<file path=customXml/itemProps3.xml><?xml version="1.0" encoding="utf-8"?>
 <ds:datastoreItem xmlns:ds="http://schemas.openxmlformats.org/officeDocument/2006/customXml" ds:itemID="{A50EC660-24D0-43A0-AE5E-E274115E726B}">
   <ds:schemaRefs>
     <ds:schemaRef ds:uri="http://schemas.microsoft.com/office/2006/documentManagement/types"/>
@@ -11734,19 +11934,4 @@
     <ds:schemaRef ds:uri="http://schemas.microsoft.com/office/infopath/2007/PartnerControls"/>
   </ds:schemaRefs>
 </ds:datastoreItem>
-</file>
-
-<file path=customXml/itemProps3.xml><?xml version="1.0" encoding="utf-8"?>
-<ds:datastoreItem xmlns:ds="http://schemas.openxmlformats.org/officeDocument/2006/customXml" ds:itemID="{E8DB7DEB-074E-4EE8-9B6E-FD277323109C}">
-  <ds:schemaRefs>
-    <ds:schemaRef ds:uri="http://schemas.microsoft.com/office/2006/metadata/contentType"/>
-    <ds:schemaRef ds:uri="http://schemas.microsoft.com/office/2006/metadata/properties/metaAttributes"/>
-    <ds:schemaRef ds:uri="http://www.w3.org/2001/XMLSchema"/>
-    <ds:schemaRef ds:uri="http://schemas.microsoft.com/office/2006/metadata/properties"/>
-    <ds:schemaRef ds:uri="http://schemas.openxmlformats.org/package/2006/metadata/core-properties"/>
-    <ds:schemaRef ds:uri="http://purl.org/dc/elements/1.1/"/>
-    <ds:schemaRef ds:uri="http://purl.org/dc/terms/"/>
-    <ds:schemaRef ds:uri="http://schemas.microsoft.com/office/internal/2005/internalDocumentation"/>
-  </ds:schemaRefs>
-</ds:datastoreItem>
 </file>
</xml_diff>

<commit_message>
Add final IDEAS Desk info
</commit_message>
<xml_diff>
--- a/final-presentations/2021-04-12-ecpam/00-intro.pptx
+++ b/final-presentations/2021-04-12-ecpam/00-intro.pptx
@@ -275,7 +275,7 @@
           <a:p>
             <a:fld id="{0B842F42-2CE9-4E35-95C1-410DC08A50B1}" type="datetimeFigureOut">
               <a:rPr lang="en-US" smtClean="0"/>
-              <a:t>4/10/2021</a:t>
+              <a:t>4/12/2021</a:t>
             </a:fld>
             <a:endParaRPr lang="en-US"/>
           </a:p>
@@ -440,7 +440,7 @@
           <a:p>
             <a:fld id="{6F282904-F315-4730-8D91-37D99E141A6F}" type="datetimeFigureOut">
               <a:rPr lang="en-US" smtClean="0"/>
-              <a:t>4/10/2021</a:t>
+              <a:t>4/12/2021</a:t>
             </a:fld>
             <a:endParaRPr lang="en-US"/>
           </a:p>
@@ -10596,7 +10596,15 @@
           <a:p>
             <a:r>
               <a:rPr lang="en-US" dirty="0"/>
-              <a:t>Related Events at the ECP Annual Meeting</a:t>
+              <a:t>Related Events at the ECP Annual Meeting (</a:t>
+            </a:r>
+            <a:r>
+              <a:rPr lang="en-US" i="1" dirty="0"/>
+              <a:t>all times Eastern</a:t>
+            </a:r>
+            <a:r>
+              <a:rPr lang="en-US" dirty="0"/>
+              <a:t>)</a:t>
             </a:r>
           </a:p>
         </p:txBody>
@@ -10645,13 +10653,22 @@
               </a:spcBef>
             </a:pPr>
             <a:r>
+              <a:rPr lang="en-US" sz="1800" b="1" dirty="0">
+                <a:solidFill>
+                  <a:srgbClr val="333333"/>
+                </a:solidFill>
+                <a:latin typeface="Helvetica Neue"/>
+              </a:rPr>
+              <a:t>Room 125 </a:t>
+            </a:r>
+            <a:r>
               <a:rPr lang="en-US" sz="1800" dirty="0">
                 <a:solidFill>
                   <a:srgbClr val="333333"/>
                 </a:solidFill>
                 <a:latin typeface="Helvetica Neue"/>
               </a:rPr>
-              <a:t>Room ??? In the </a:t>
+              <a:t>in the </a:t>
             </a:r>
             <a:r>
               <a:rPr lang="en-US" sz="1800" dirty="0" err="1">
@@ -10693,7 +10710,7 @@
                 </a:solidFill>
                 <a:latin typeface="Helvetica Neue"/>
               </a:rPr>
-              <a:t>12:30pm-4:00pm Tuesday through Friday</a:t>
+              <a:t>12:30pm-2:00pm Monday through Friday</a:t>
             </a:r>
             <a:endParaRPr lang="en-US" sz="1800" b="0" i="0" dirty="0">
               <a:solidFill>
@@ -11835,6 +11852,15 @@
 </file>
 
 <file path=customXml/item1.xml><?xml version="1.0" encoding="utf-8"?>
+<?mso-contentType ?>
+<FormTemplates xmlns="http://schemas.microsoft.com/sharepoint/v3/contenttype/forms">
+  <Display>DocumentLibraryForm</Display>
+  <Edit>DocumentLibraryForm</Edit>
+  <New>DocumentLibraryForm</New>
+</FormTemplates>
+</file>
+
+<file path=customXml/item2.xml><?xml version="1.0" encoding="utf-8"?>
 <ct:contentTypeSchema xmlns:ct="http://schemas.microsoft.com/office/2006/metadata/contentType" xmlns:ma="http://schemas.microsoft.com/office/2006/metadata/properties/metaAttributes" ct:_="" ma:_="" ma:contentTypeName="Document" ma:contentTypeID="0x010100565464437F680748A68B85EB6594EA7D" ma:contentTypeVersion="0" ma:contentTypeDescription="Create a new document." ma:contentTypeScope="" ma:versionID="fe3f4dd58d5914c51cfc6deaa8ad845c">
   <xsd:schema xmlns:xsd="http://www.w3.org/2001/XMLSchema" xmlns:p="http://schemas.microsoft.com/office/2006/metadata/properties" targetNamespace="http://schemas.microsoft.com/office/2006/metadata/properties" ma:root="true" ma:fieldsID="4aeb20c0e3442673af7ee10786458764">
     <xsd:element name="properties">
@@ -11883,15 +11909,6 @@
 </ct:contentTypeSchema>
 </file>
 
-<file path=customXml/item2.xml><?xml version="1.0" encoding="utf-8"?>
-<?mso-contentType ?>
-<FormTemplates xmlns="http://schemas.microsoft.com/sharepoint/v3/contenttype/forms">
-  <Display>DocumentLibraryForm</Display>
-  <Edit>DocumentLibraryForm</Edit>
-  <New>DocumentLibraryForm</New>
-</FormTemplates>
-</file>
-
 <file path=customXml/item3.xml><?xml version="1.0" encoding="utf-8"?>
 <p:properties xmlns:p="http://schemas.microsoft.com/office/2006/metadata/properties" xmlns:xsi="http://www.w3.org/2001/XMLSchema-instance" xmlns:pc="http://schemas.microsoft.com/office/infopath/2007/PartnerControls">
   <documentManagement/>
@@ -11899,6 +11916,14 @@
 </file>
 
 <file path=customXml/itemProps1.xml><?xml version="1.0" encoding="utf-8"?>
+<ds:datastoreItem xmlns:ds="http://schemas.openxmlformats.org/officeDocument/2006/customXml" ds:itemID="{19E20559-B232-4371-8690-E3D8007EDB82}">
+  <ds:schemaRefs>
+    <ds:schemaRef ds:uri="http://schemas.microsoft.com/sharepoint/v3/contenttype/forms"/>
+  </ds:schemaRefs>
+</ds:datastoreItem>
+</file>
+
+<file path=customXml/itemProps2.xml><?xml version="1.0" encoding="utf-8"?>
 <ds:datastoreItem xmlns:ds="http://schemas.openxmlformats.org/officeDocument/2006/customXml" ds:itemID="{E8DB7DEB-074E-4EE8-9B6E-FD277323109C}">
   <ds:schemaRefs>
     <ds:schemaRef ds:uri="http://schemas.microsoft.com/office/2006/metadata/contentType"/>
@@ -11909,14 +11934,6 @@
     <ds:schemaRef ds:uri="http://purl.org/dc/elements/1.1/"/>
     <ds:schemaRef ds:uri="http://purl.org/dc/terms/"/>
     <ds:schemaRef ds:uri="http://schemas.microsoft.com/office/internal/2005/internalDocumentation"/>
-  </ds:schemaRefs>
-</ds:datastoreItem>
-</file>
-
-<file path=customXml/itemProps2.xml><?xml version="1.0" encoding="utf-8"?>
-<ds:datastoreItem xmlns:ds="http://schemas.openxmlformats.org/officeDocument/2006/customXml" ds:itemID="{19E20559-B232-4371-8690-E3D8007EDB82}">
-  <ds:schemaRefs>
-    <ds:schemaRef ds:uri="http://schemas.microsoft.com/sharepoint/v3/contenttype/forms"/>
   </ds:schemaRefs>
 </ds:datastoreItem>
 </file>

</xml_diff>